<commit_message>
lots and lots of things
</commit_message>
<xml_diff>
--- a/ecoop18/PPTX.pptx
+++ b/ecoop18/PPTX.pptx
@@ -5,14 +5,15 @@
     <p:sldMasterId id="2147483661" r:id="rId1"/>
   </p:sldMasterIdLst>
   <p:notesMasterIdLst>
-    <p:notesMasterId r:id="rId4"/>
+    <p:notesMasterId r:id="rId5"/>
   </p:notesMasterIdLst>
   <p:handoutMasterIdLst>
-    <p:handoutMasterId r:id="rId5"/>
+    <p:handoutMasterId r:id="rId6"/>
   </p:handoutMasterIdLst>
   <p:sldIdLst>
     <p:sldId id="374" r:id="rId2"/>
     <p:sldId id="375" r:id="rId3"/>
+    <p:sldId id="376" r:id="rId4"/>
   </p:sldIdLst>
   <p:sldSz cx="12188825" cy="6858000"/>
   <p:notesSz cx="9144000" cy="6858000"/>
@@ -220,7 +221,7 @@
           <a:p>
             <a:fld id="{08BBBA21-0F57-9C49-924A-128DE27BA9E4}" type="datetimeFigureOut">
               <a:rPr lang="en-US" smtClean="0"/>
-              <a:t>10/11/17</a:t>
+              <a:t>12/7/17</a:t>
             </a:fld>
             <a:endParaRPr lang="en-US"/>
           </a:p>
@@ -385,7 +386,7 @@
           <a:p>
             <a:fld id="{75C46ED2-2B70-3C4C-98F5-415359DDD016}" type="datetimeFigureOut">
               <a:rPr lang="en-US" smtClean="0"/>
-              <a:t>10/11/17</a:t>
+              <a:t>12/7/17</a:t>
             </a:fld>
             <a:endParaRPr lang="en-US"/>
           </a:p>
@@ -968,7 +969,7 @@
           <a:p>
             <a:fld id="{A18008DE-A5BD-1A4D-BE02-A2D386CD06E1}" type="datetime1">
               <a:rPr lang="en-US" smtClean="0"/>
-              <a:t>10/11/17</a:t>
+              <a:t>12/7/17</a:t>
             </a:fld>
             <a:endParaRPr lang="en-US" dirty="0"/>
           </a:p>
@@ -1183,7 +1184,7 @@
           <a:p>
             <a:fld id="{B5EF32DE-D90A-E642-825B-9FCF342A1162}" type="datetime1">
               <a:rPr lang="en-US" smtClean="0"/>
-              <a:t>10/11/17</a:t>
+              <a:t>12/7/17</a:t>
             </a:fld>
             <a:endParaRPr lang="en-US" dirty="0"/>
           </a:p>
@@ -1439,7 +1440,7 @@
           <a:p>
             <a:fld id="{649457DE-9EBF-9143-9795-82CF17B445CF}" type="datetime1">
               <a:rPr lang="en-US" smtClean="0"/>
-              <a:t>10/11/17</a:t>
+              <a:t>12/7/17</a:t>
             </a:fld>
             <a:endParaRPr lang="en-US" dirty="0"/>
           </a:p>
@@ -1609,7 +1610,7 @@
           <a:p>
             <a:fld id="{7E4AD076-CDF7-4841-9CF3-620EFF685EAB}" type="datetime1">
               <a:rPr lang="en-US" smtClean="0"/>
-              <a:t>10/11/17</a:t>
+              <a:t>12/7/17</a:t>
             </a:fld>
             <a:endParaRPr lang="en-US" dirty="0"/>
           </a:p>
@@ -1951,7 +1952,7 @@
           <a:p>
             <a:fld id="{16C45E72-1BE8-A94C-BF6B-032E4F2535B3}" type="datetime1">
               <a:rPr lang="en-US" smtClean="0"/>
-              <a:t>10/11/17</a:t>
+              <a:t>12/7/17</a:t>
             </a:fld>
             <a:endParaRPr lang="en-US" dirty="0"/>
           </a:p>
@@ -2233,7 +2234,7 @@
           <a:p>
             <a:fld id="{CA818A7F-B86F-9945-B15E-388AD4BBA3D3}" type="datetime1">
               <a:rPr lang="en-US" smtClean="0"/>
-              <a:t>10/11/17</a:t>
+              <a:t>12/7/17</a:t>
             </a:fld>
             <a:endParaRPr lang="en-US" dirty="0"/>
           </a:p>
@@ -2612,7 +2613,7 @@
           <a:p>
             <a:fld id="{449BACD9-798F-8046-8DD3-8C57872F4D86}" type="datetime1">
               <a:rPr lang="en-US" smtClean="0"/>
-              <a:t>10/11/17</a:t>
+              <a:t>12/7/17</a:t>
             </a:fld>
             <a:endParaRPr lang="en-US" dirty="0"/>
           </a:p>
@@ -2730,7 +2731,7 @@
           <a:p>
             <a:fld id="{C0BAA555-D64D-5D4F-B88B-991D46536871}" type="datetime1">
               <a:rPr lang="en-US" smtClean="0"/>
-              <a:t>10/11/17</a:t>
+              <a:t>12/7/17</a:t>
             </a:fld>
             <a:endParaRPr lang="en-US" dirty="0"/>
           </a:p>
@@ -2901,7 +2902,7 @@
           <a:p>
             <a:fld id="{8DD526EF-721E-8D4D-91F5-EE7274AB8C33}" type="datetime1">
               <a:rPr lang="en-US" smtClean="0"/>
-              <a:t>10/11/17</a:t>
+              <a:t>12/7/17</a:t>
             </a:fld>
             <a:endParaRPr lang="en-US" dirty="0"/>
           </a:p>
@@ -3256,7 +3257,7 @@
           <a:p>
             <a:fld id="{CE800D8A-A16B-9B41-8621-0296007FF8D5}" type="datetime1">
               <a:rPr lang="en-US" smtClean="0"/>
-              <a:t>10/11/17</a:t>
+              <a:t>12/7/17</a:t>
             </a:fld>
             <a:endParaRPr lang="en-US" dirty="0"/>
           </a:p>
@@ -3638,7 +3639,7 @@
           <a:p>
             <a:fld id="{476E1EC5-8A6D-F345-ABD7-850C85428ACA}" type="datetime1">
               <a:rPr lang="en-US" smtClean="0"/>
-              <a:t>10/11/17</a:t>
+              <a:t>12/7/17</a:t>
             </a:fld>
             <a:endParaRPr lang="en-US" dirty="0"/>
           </a:p>
@@ -3928,7 +3929,7 @@
           <a:p>
             <a:fld id="{B7CBA48C-7BBF-7B43-B67E-1BF36C07B050}" type="datetime1">
               <a:rPr lang="en-US" smtClean="0"/>
-              <a:t>10/11/17</a:t>
+              <a:t>12/7/17</a:t>
             </a:fld>
             <a:endParaRPr lang="en-US" dirty="0"/>
           </a:p>
@@ -5041,8 +5042,8 @@
           </a:p>
         </p:txBody>
       </p:sp>
-      <mc:AlternateContent xmlns:mc="http://schemas.openxmlformats.org/markup-compatibility/2006">
-        <mc:Choice xmlns:a14="http://schemas.microsoft.com/office/drawing/2010/main" Requires="a14">
+      <mc:AlternateContent xmlns:mc="http://schemas.openxmlformats.org/markup-compatibility/2006" xmlns:a14="http://schemas.microsoft.com/office/drawing/2010/main">
+        <mc:Choice Requires="a14">
           <p:sp>
             <p:nvSpPr>
               <p:cNvPr id="11" name="Rounded Rectangle 10"/>
@@ -5197,7 +5198,7 @@
             </p:txBody>
           </p:sp>
         </mc:Choice>
-        <mc:Fallback>
+        <mc:Fallback xmlns="">
           <p:sp>
             <p:nvSpPr>
               <p:cNvPr id="11" name="Rounded Rectangle 10"/>
@@ -5637,8 +5638,8 @@
           </a:p>
         </p:txBody>
       </p:sp>
-      <mc:AlternateContent xmlns:mc="http://schemas.openxmlformats.org/markup-compatibility/2006">
-        <mc:Choice xmlns:a14="http://schemas.microsoft.com/office/drawing/2010/main" Requires="a14">
+      <mc:AlternateContent xmlns:mc="http://schemas.openxmlformats.org/markup-compatibility/2006" xmlns:a14="http://schemas.microsoft.com/office/drawing/2010/main">
+        <mc:Choice Requires="a14">
           <p:sp>
             <p:nvSpPr>
               <p:cNvPr id="4" name="Rectangle 3"/>
@@ -5683,7 +5684,7 @@
             </p:txBody>
           </p:sp>
         </mc:Choice>
-        <mc:Fallback>
+        <mc:Fallback xmlns="">
           <p:sp>
             <p:nvSpPr>
               <p:cNvPr id="4" name="Rectangle 3"/>
@@ -5722,8 +5723,8 @@
           </p:sp>
         </mc:Fallback>
       </mc:AlternateContent>
-      <mc:AlternateContent xmlns:mc="http://schemas.openxmlformats.org/markup-compatibility/2006">
-        <mc:Choice xmlns:a14="http://schemas.microsoft.com/office/drawing/2010/main" Requires="a14">
+      <mc:AlternateContent xmlns:mc="http://schemas.openxmlformats.org/markup-compatibility/2006" xmlns:a14="http://schemas.microsoft.com/office/drawing/2010/main">
+        <mc:Choice Requires="a14">
           <p:sp>
             <p:nvSpPr>
               <p:cNvPr id="37" name="Rectangle 36"/>
@@ -5768,7 +5769,7 @@
             </p:txBody>
           </p:sp>
         </mc:Choice>
-        <mc:Fallback>
+        <mc:Fallback xmlns="">
           <p:sp>
             <p:nvSpPr>
               <p:cNvPr id="37" name="Rectangle 36"/>
@@ -7119,8 +7120,8 @@
           </p:sp>
         </mc:Fallback>
       </mc:AlternateContent>
-      <mc:AlternateContent xmlns:mc="http://schemas.openxmlformats.org/markup-compatibility/2006">
-        <mc:Choice xmlns:a14="http://schemas.microsoft.com/office/drawing/2010/main" Requires="a14">
+      <mc:AlternateContent xmlns:mc="http://schemas.openxmlformats.org/markup-compatibility/2006" xmlns:a14="http://schemas.microsoft.com/office/drawing/2010/main">
+        <mc:Choice Requires="a14">
           <p:sp>
             <p:nvSpPr>
               <p:cNvPr id="45" name="Rectangle 44"/>
@@ -7165,7 +7166,7 @@
             </p:txBody>
           </p:sp>
         </mc:Choice>
-        <mc:Fallback>
+        <mc:Fallback xmlns="">
           <p:sp>
             <p:nvSpPr>
               <p:cNvPr id="45" name="Rectangle 44"/>
@@ -10338,8 +10339,8 @@
           </a:p>
         </p:txBody>
       </p:sp>
-      <mc:AlternateContent xmlns:mc="http://schemas.openxmlformats.org/markup-compatibility/2006">
-        <mc:Choice xmlns:a14="http://schemas.microsoft.com/office/drawing/2010/main" Requires="a14">
+      <mc:AlternateContent xmlns:mc="http://schemas.openxmlformats.org/markup-compatibility/2006" xmlns:a14="http://schemas.microsoft.com/office/drawing/2010/main">
+        <mc:Choice Requires="a14">
           <p:sp>
             <p:nvSpPr>
               <p:cNvPr id="103" name="Rounded Rectangle 102"/>
@@ -10419,7 +10420,7 @@
             </p:txBody>
           </p:sp>
         </mc:Choice>
-        <mc:Fallback>
+        <mc:Fallback xmlns="">
           <p:sp>
             <p:nvSpPr>
               <p:cNvPr id="103" name="Rounded Rectangle 102"/>
@@ -10859,8 +10860,8 @@
           </a:p>
         </p:txBody>
       </p:sp>
-      <mc:AlternateContent xmlns:mc="http://schemas.openxmlformats.org/markup-compatibility/2006">
-        <mc:Choice xmlns:a14="http://schemas.microsoft.com/office/drawing/2010/main" Requires="a14">
+      <mc:AlternateContent xmlns:mc="http://schemas.openxmlformats.org/markup-compatibility/2006" xmlns:a14="http://schemas.microsoft.com/office/drawing/2010/main">
+        <mc:Choice Requires="a14">
           <p:sp>
             <p:nvSpPr>
               <p:cNvPr id="107" name="Rectangle 106"/>
@@ -10905,7 +10906,7 @@
             </p:txBody>
           </p:sp>
         </mc:Choice>
-        <mc:Fallback>
+        <mc:Fallback xmlns="">
           <p:sp>
             <p:nvSpPr>
               <p:cNvPr id="107" name="Rectangle 106"/>
@@ -10944,8 +10945,8 @@
           </p:sp>
         </mc:Fallback>
       </mc:AlternateContent>
-      <mc:AlternateContent xmlns:mc="http://schemas.openxmlformats.org/markup-compatibility/2006">
-        <mc:Choice xmlns:a14="http://schemas.microsoft.com/office/drawing/2010/main" Requires="a14">
+      <mc:AlternateContent xmlns:mc="http://schemas.openxmlformats.org/markup-compatibility/2006" xmlns:a14="http://schemas.microsoft.com/office/drawing/2010/main">
+        <mc:Choice Requires="a14">
           <p:sp>
             <p:nvSpPr>
               <p:cNvPr id="108" name="Rectangle 107"/>
@@ -10990,7 +10991,7 @@
             </p:txBody>
           </p:sp>
         </mc:Choice>
-        <mc:Fallback>
+        <mc:Fallback xmlns="">
           <p:sp>
             <p:nvSpPr>
               <p:cNvPr id="108" name="Rectangle 107"/>
@@ -11568,6 +11569,988 @@
     <p:extLst>
       <p:ext uri="{BB962C8B-B14F-4D97-AF65-F5344CB8AC3E}">
         <p14:creationId xmlns:p14="http://schemas.microsoft.com/office/powerpoint/2010/main" val="903835777"/>
+      </p:ext>
+    </p:extLst>
+  </p:cSld>
+  <p:clrMapOvr>
+    <a:masterClrMapping/>
+  </p:clrMapOvr>
+</p:sld>
+</file>
+
+<file path=ppt/slides/slide3.xml><?xml version="1.0" encoding="utf-8"?>
+<p:sld xmlns:a="http://schemas.openxmlformats.org/drawingml/2006/main" xmlns:r="http://schemas.openxmlformats.org/officeDocument/2006/relationships" xmlns:p="http://schemas.openxmlformats.org/presentationml/2006/main">
+  <p:cSld>
+    <p:spTree>
+      <p:nvGrpSpPr>
+        <p:cNvPr id="1" name=""/>
+        <p:cNvGrpSpPr/>
+        <p:nvPr/>
+      </p:nvGrpSpPr>
+      <p:grpSpPr>
+        <a:xfrm>
+          <a:off x="0" y="0"/>
+          <a:ext cx="0" cy="0"/>
+          <a:chOff x="0" y="0"/>
+          <a:chExt cx="0" cy="0"/>
+        </a:xfrm>
+      </p:grpSpPr>
+      <p:sp>
+        <p:nvSpPr>
+          <p:cNvPr id="4" name="Rounded Rectangle 3"/>
+          <p:cNvSpPr/>
+          <p:nvPr/>
+        </p:nvSpPr>
+        <p:spPr>
+          <a:xfrm>
+            <a:off x="4612415" y="1950047"/>
+            <a:ext cx="4662935" cy="2904861"/>
+          </a:xfrm>
+          <a:prstGeom prst="roundRect">
+            <a:avLst/>
+          </a:prstGeom>
+          <a:solidFill>
+            <a:schemeClr val="accent1">
+              <a:alpha val="10000"/>
+            </a:schemeClr>
+          </a:solidFill>
+        </p:spPr>
+        <p:style>
+          <a:lnRef idx="2">
+            <a:schemeClr val="accent1">
+              <a:shade val="50000"/>
+            </a:schemeClr>
+          </a:lnRef>
+          <a:fillRef idx="1">
+            <a:schemeClr val="accent1"/>
+          </a:fillRef>
+          <a:effectRef idx="0">
+            <a:schemeClr val="accent1"/>
+          </a:effectRef>
+          <a:fontRef idx="minor">
+            <a:schemeClr val="lt1"/>
+          </a:fontRef>
+        </p:style>
+        <p:txBody>
+          <a:bodyPr rtlCol="0" anchor="ctr"/>
+          <a:lstStyle/>
+          <a:p>
+            <a:pPr algn="ctr"/>
+            <a:endParaRPr lang="en-US" sz="1799" dirty="0">
+              <a:solidFill>
+                <a:schemeClr val="tx1"/>
+              </a:solidFill>
+            </a:endParaRPr>
+          </a:p>
+        </p:txBody>
+      </p:sp>
+      <p:sp>
+        <p:nvSpPr>
+          <p:cNvPr id="5" name="Rounded Rectangle 4"/>
+          <p:cNvSpPr/>
+          <p:nvPr/>
+        </p:nvSpPr>
+        <p:spPr>
+          <a:xfrm>
+            <a:off x="4844004" y="2277128"/>
+            <a:ext cx="1552978" cy="563129"/>
+          </a:xfrm>
+          <a:prstGeom prst="roundRect">
+            <a:avLst/>
+          </a:prstGeom>
+          <a:gradFill rotWithShape="1">
+            <a:gsLst>
+              <a:gs pos="0">
+                <a:srgbClr val="5B9BD5">
+                  <a:lumMod val="110000"/>
+                  <a:satMod val="105000"/>
+                  <a:tint val="67000"/>
+                </a:srgbClr>
+              </a:gs>
+              <a:gs pos="50000">
+                <a:srgbClr val="5B9BD5">
+                  <a:lumMod val="105000"/>
+                  <a:satMod val="103000"/>
+                  <a:tint val="73000"/>
+                </a:srgbClr>
+              </a:gs>
+              <a:gs pos="100000">
+                <a:srgbClr val="5B9BD5">
+                  <a:lumMod val="105000"/>
+                  <a:satMod val="109000"/>
+                  <a:tint val="81000"/>
+                </a:srgbClr>
+              </a:gs>
+            </a:gsLst>
+            <a:lin ang="5400000" scaled="0"/>
+          </a:gradFill>
+          <a:ln w="6350" cap="flat" cmpd="sng" algn="ctr">
+            <a:solidFill>
+              <a:srgbClr val="5B9BD5"/>
+            </a:solidFill>
+            <a:prstDash val="solid"/>
+            <a:miter lim="800000"/>
+          </a:ln>
+          <a:effectLst>
+            <a:outerShdw blurRad="50800" dist="25400" dir="2700000" algn="tl" rotWithShape="0">
+              <a:prstClr val="black">
+                <a:alpha val="40000"/>
+              </a:prstClr>
+            </a:outerShdw>
+          </a:effectLst>
+        </p:spPr>
+        <p:txBody>
+          <a:bodyPr rtlCol="0" anchor="ctr"/>
+          <a:lstStyle/>
+          <a:p>
+            <a:pPr marL="0" marR="0" lvl="0" indent="0" algn="ctr" defTabSz="914400" eaLnBrk="1" fontAlgn="auto" latinLnBrk="0" hangingPunct="1">
+              <a:lnSpc>
+                <a:spcPct val="100000"/>
+              </a:lnSpc>
+              <a:spcBef>
+                <a:spcPts val="0"/>
+              </a:spcBef>
+              <a:spcAft>
+                <a:spcPts val="0"/>
+              </a:spcAft>
+              <a:buClrTx/>
+              <a:buSzTx/>
+              <a:buFontTx/>
+              <a:buNone/>
+              <a:tabLst/>
+              <a:defRPr/>
+            </a:pPr>
+            <a:r>
+              <a:rPr lang="en-US" sz="1500" kern="0" cap="small" dirty="0">
+                <a:solidFill>
+                  <a:prstClr val="black"/>
+                </a:solidFill>
+                <a:latin typeface="Calibri" panose="020F0502020204030204"/>
+                <a:ea typeface=""/>
+                <a:cs typeface=""/>
+              </a:rPr>
+              <a:t>Extended </a:t>
+            </a:r>
+            <a:r>
+              <a:rPr kumimoji="0" lang="en-US" sz="1500" b="0" i="0" u="none" strike="noStrike" kern="0" cap="small" spc="0" normalizeH="0" baseline="0" noProof="0" dirty="0" smtClean="0">
+                <a:ln>
+                  <a:noFill/>
+                </a:ln>
+                <a:solidFill>
+                  <a:prstClr val="black"/>
+                </a:solidFill>
+                <a:effectLst/>
+                <a:uLnTx/>
+                <a:uFillTx/>
+                <a:latin typeface="Calibri" panose="020F0502020204030204"/>
+                <a:ea typeface=""/>
+                <a:cs typeface=""/>
+              </a:rPr>
+              <a:t>JS programs</a:t>
+            </a:r>
+          </a:p>
+        </p:txBody>
+      </p:sp>
+      <p:sp>
+        <p:nvSpPr>
+          <p:cNvPr id="6" name="Oval 5"/>
+          <p:cNvSpPr/>
+          <p:nvPr/>
+        </p:nvSpPr>
+        <p:spPr>
+          <a:xfrm>
+            <a:off x="4844004" y="3090154"/>
+            <a:ext cx="1552979" cy="563129"/>
+          </a:xfrm>
+          <a:prstGeom prst="ellipse">
+            <a:avLst/>
+          </a:prstGeom>
+          <a:solidFill>
+            <a:srgbClr val="FFC000">
+              <a:lumMod val="20000"/>
+              <a:lumOff val="80000"/>
+            </a:srgbClr>
+          </a:solidFill>
+          <a:ln w="6350" cap="flat" cmpd="sng" algn="ctr">
+            <a:solidFill>
+              <a:srgbClr val="4472C4">
+                <a:shade val="50000"/>
+              </a:srgbClr>
+            </a:solidFill>
+            <a:prstDash val="solid"/>
+            <a:miter lim="800000"/>
+          </a:ln>
+          <a:effectLst>
+            <a:outerShdw blurRad="50800" dist="25400" dir="2700000" algn="tl" rotWithShape="0">
+              <a:prstClr val="black">
+                <a:alpha val="40000"/>
+              </a:prstClr>
+            </a:outerShdw>
+          </a:effectLst>
+        </p:spPr>
+        <p:txBody>
+          <a:bodyPr rtlCol="0" anchor="ctr"/>
+          <a:lstStyle/>
+          <a:p>
+            <a:pPr marL="0" marR="0" lvl="0" indent="0" algn="ctr" defTabSz="914400" eaLnBrk="1" fontAlgn="auto" latinLnBrk="0" hangingPunct="1">
+              <a:lnSpc>
+                <a:spcPct val="100000"/>
+              </a:lnSpc>
+              <a:spcBef>
+                <a:spcPts val="0"/>
+              </a:spcBef>
+              <a:spcAft>
+                <a:spcPts val="0"/>
+              </a:spcAft>
+              <a:buClrTx/>
+              <a:buSzTx/>
+              <a:buFontTx/>
+              <a:buNone/>
+              <a:tabLst/>
+              <a:defRPr/>
+            </a:pPr>
+            <a:r>
+              <a:rPr kumimoji="0" lang="en-US" sz="1500" b="0" i="0" u="none" strike="noStrike" kern="0" cap="small" spc="0" normalizeH="0" baseline="0" noProof="0" dirty="0" smtClean="0">
+                <a:ln>
+                  <a:noFill/>
+                </a:ln>
+                <a:solidFill>
+                  <a:prstClr val="black"/>
+                </a:solidFill>
+                <a:effectLst/>
+                <a:uLnTx/>
+                <a:uFillTx/>
+                <a:latin typeface="Calibri" panose="020F0502020204030204"/>
+                <a:ea typeface=""/>
+                <a:cs typeface=""/>
+              </a:rPr>
+              <a:t>JS-2-JSIL</a:t>
+            </a:r>
+          </a:p>
+          <a:p>
+            <a:pPr marL="0" marR="0" lvl="0" indent="0" algn="ctr" defTabSz="914400" eaLnBrk="1" fontAlgn="auto" latinLnBrk="0" hangingPunct="1">
+              <a:lnSpc>
+                <a:spcPct val="100000"/>
+              </a:lnSpc>
+              <a:spcBef>
+                <a:spcPts val="0"/>
+              </a:spcBef>
+              <a:spcAft>
+                <a:spcPts val="0"/>
+              </a:spcAft>
+              <a:buClrTx/>
+              <a:buSzTx/>
+              <a:buFontTx/>
+              <a:buNone/>
+              <a:tabLst/>
+              <a:defRPr/>
+            </a:pPr>
+            <a:r>
+              <a:rPr kumimoji="0" lang="en-US" sz="1300" b="0" i="0" u="none" strike="noStrike" kern="0" cap="small" spc="0" normalizeH="0" baseline="0" noProof="0" dirty="0" smtClean="0">
+                <a:ln>
+                  <a:noFill/>
+                </a:ln>
+                <a:solidFill>
+                  <a:prstClr val="black"/>
+                </a:solidFill>
+                <a:effectLst/>
+                <a:uLnTx/>
+                <a:uFillTx/>
+                <a:latin typeface="Calibri" panose="020F0502020204030204"/>
+                <a:ea typeface=""/>
+                <a:cs typeface=""/>
+              </a:rPr>
+              <a:t>Compiler</a:t>
+            </a:r>
+          </a:p>
+        </p:txBody>
+      </p:sp>
+      <p:cxnSp>
+        <p:nvCxnSpPr>
+          <p:cNvPr id="7" name="Straight Arrow Connector 6"/>
+          <p:cNvCxnSpPr>
+            <a:stCxn id="5" idx="2"/>
+            <a:endCxn id="6" idx="0"/>
+          </p:cNvCxnSpPr>
+          <p:nvPr/>
+        </p:nvCxnSpPr>
+        <p:spPr>
+          <a:xfrm>
+            <a:off x="5620493" y="2840257"/>
+            <a:ext cx="1" cy="249897"/>
+          </a:xfrm>
+          <a:prstGeom prst="straightConnector1">
+            <a:avLst/>
+          </a:prstGeom>
+          <a:noFill/>
+          <a:ln w="12700" cap="flat" cmpd="sng" algn="ctr">
+            <a:solidFill>
+              <a:srgbClr val="4472C4"/>
+            </a:solidFill>
+            <a:prstDash val="solid"/>
+            <a:miter lim="800000"/>
+            <a:tailEnd type="triangle"/>
+          </a:ln>
+          <a:effectLst/>
+        </p:spPr>
+      </p:cxnSp>
+      <p:sp>
+        <p:nvSpPr>
+          <p:cNvPr id="8" name="Rounded Rectangle 7"/>
+          <p:cNvSpPr/>
+          <p:nvPr/>
+        </p:nvSpPr>
+        <p:spPr>
+          <a:xfrm>
+            <a:off x="4844005" y="3885269"/>
+            <a:ext cx="1552977" cy="563129"/>
+          </a:xfrm>
+          <a:prstGeom prst="roundRect">
+            <a:avLst/>
+          </a:prstGeom>
+          <a:gradFill rotWithShape="1">
+            <a:gsLst>
+              <a:gs pos="0">
+                <a:srgbClr val="5B9BD5">
+                  <a:lumMod val="110000"/>
+                  <a:satMod val="105000"/>
+                  <a:tint val="67000"/>
+                </a:srgbClr>
+              </a:gs>
+              <a:gs pos="50000">
+                <a:srgbClr val="5B9BD5">
+                  <a:lumMod val="105000"/>
+                  <a:satMod val="103000"/>
+                  <a:tint val="73000"/>
+                </a:srgbClr>
+              </a:gs>
+              <a:gs pos="100000">
+                <a:srgbClr val="5B9BD5">
+                  <a:lumMod val="105000"/>
+                  <a:satMod val="109000"/>
+                  <a:tint val="81000"/>
+                </a:srgbClr>
+              </a:gs>
+            </a:gsLst>
+            <a:lin ang="5400000" scaled="0"/>
+          </a:gradFill>
+          <a:ln w="6350" cap="flat" cmpd="sng" algn="ctr">
+            <a:solidFill>
+              <a:srgbClr val="5B9BD5"/>
+            </a:solidFill>
+            <a:prstDash val="solid"/>
+            <a:miter lim="800000"/>
+          </a:ln>
+          <a:effectLst>
+            <a:outerShdw blurRad="50800" dist="25400" dir="2700000" algn="tl" rotWithShape="0">
+              <a:prstClr val="black">
+                <a:alpha val="40000"/>
+              </a:prstClr>
+            </a:outerShdw>
+          </a:effectLst>
+        </p:spPr>
+        <p:txBody>
+          <a:bodyPr rtlCol="0" anchor="ctr"/>
+          <a:lstStyle/>
+          <a:p>
+            <a:pPr marL="0" marR="0" lvl="0" indent="0" algn="ctr" defTabSz="914400" eaLnBrk="1" fontAlgn="auto" latinLnBrk="0" hangingPunct="1">
+              <a:lnSpc>
+                <a:spcPct val="100000"/>
+              </a:lnSpc>
+              <a:spcBef>
+                <a:spcPts val="0"/>
+              </a:spcBef>
+              <a:spcAft>
+                <a:spcPts val="0"/>
+              </a:spcAft>
+              <a:buClrTx/>
+              <a:buSzTx/>
+              <a:buFontTx/>
+              <a:buNone/>
+              <a:tabLst/>
+              <a:defRPr/>
+            </a:pPr>
+            <a:r>
+              <a:rPr kumimoji="0" lang="en-US" sz="1500" b="0" i="0" u="none" strike="noStrike" kern="0" cap="small" spc="0" normalizeH="0" baseline="0" noProof="0" dirty="0" smtClean="0">
+                <a:ln>
+                  <a:noFill/>
+                </a:ln>
+                <a:solidFill>
+                  <a:prstClr val="black"/>
+                </a:solidFill>
+                <a:effectLst/>
+                <a:uLnTx/>
+                <a:uFillTx/>
+                <a:latin typeface="Calibri" panose="020F0502020204030204"/>
+                <a:ea typeface=""/>
+                <a:cs typeface=""/>
+              </a:rPr>
+              <a:t>Extended JSIL programs</a:t>
+            </a:r>
+          </a:p>
+        </p:txBody>
+      </p:sp>
+      <p:cxnSp>
+        <p:nvCxnSpPr>
+          <p:cNvPr id="9" name="Straight Arrow Connector 8"/>
+          <p:cNvCxnSpPr>
+            <a:stCxn id="6" idx="4"/>
+            <a:endCxn id="8" idx="0"/>
+          </p:cNvCxnSpPr>
+          <p:nvPr/>
+        </p:nvCxnSpPr>
+        <p:spPr>
+          <a:xfrm>
+            <a:off x="5620494" y="3653283"/>
+            <a:ext cx="0" cy="231986"/>
+          </a:xfrm>
+          <a:prstGeom prst="straightConnector1">
+            <a:avLst/>
+          </a:prstGeom>
+          <a:noFill/>
+          <a:ln w="12700" cap="flat" cmpd="sng" algn="ctr">
+            <a:solidFill>
+              <a:srgbClr val="4472C4"/>
+            </a:solidFill>
+            <a:prstDash val="solid"/>
+            <a:miter lim="800000"/>
+            <a:tailEnd type="triangle"/>
+          </a:ln>
+          <a:effectLst/>
+        </p:spPr>
+      </p:cxnSp>
+      <p:sp>
+        <p:nvSpPr>
+          <p:cNvPr id="10" name="Oval 9"/>
+          <p:cNvSpPr/>
+          <p:nvPr/>
+        </p:nvSpPr>
+        <p:spPr>
+          <a:xfrm>
+            <a:off x="6718927" y="2069996"/>
+            <a:ext cx="2347910" cy="869672"/>
+          </a:xfrm>
+          <a:prstGeom prst="ellipse">
+            <a:avLst/>
+          </a:prstGeom>
+          <a:solidFill>
+            <a:srgbClr val="FFC000">
+              <a:lumMod val="20000"/>
+              <a:lumOff val="80000"/>
+            </a:srgbClr>
+          </a:solidFill>
+          <a:ln w="6350" cap="flat" cmpd="sng" algn="ctr">
+            <a:solidFill>
+              <a:srgbClr val="4472C4">
+                <a:shade val="50000"/>
+              </a:srgbClr>
+            </a:solidFill>
+            <a:prstDash val="solid"/>
+            <a:miter lim="800000"/>
+          </a:ln>
+          <a:effectLst>
+            <a:outerShdw blurRad="50800" dist="25400" dir="2700000" algn="tl" rotWithShape="0">
+              <a:prstClr val="black">
+                <a:alpha val="40000"/>
+              </a:prstClr>
+            </a:outerShdw>
+          </a:effectLst>
+        </p:spPr>
+        <p:txBody>
+          <a:bodyPr rtlCol="0" anchor="ctr"/>
+          <a:lstStyle/>
+          <a:p>
+            <a:pPr marL="0" marR="0" lvl="0" indent="0" algn="ctr" defTabSz="914400" eaLnBrk="1" fontAlgn="auto" latinLnBrk="0" hangingPunct="1">
+              <a:lnSpc>
+                <a:spcPct val="100000"/>
+              </a:lnSpc>
+              <a:spcBef>
+                <a:spcPts val="0"/>
+              </a:spcBef>
+              <a:spcAft>
+                <a:spcPts val="0"/>
+              </a:spcAft>
+              <a:buClrTx/>
+              <a:buSzTx/>
+              <a:buFontTx/>
+              <a:buNone/>
+              <a:tabLst/>
+              <a:defRPr/>
+            </a:pPr>
+            <a:r>
+              <a:rPr kumimoji="0" lang="en-US" sz="1500" b="0" i="0" u="none" strike="noStrike" kern="0" cap="small" spc="0" normalizeH="0" baseline="0" noProof="0" dirty="0" smtClean="0">
+                <a:ln>
+                  <a:noFill/>
+                </a:ln>
+                <a:solidFill>
+                  <a:prstClr val="black"/>
+                </a:solidFill>
+                <a:effectLst/>
+                <a:uLnTx/>
+                <a:uFillTx/>
+                <a:latin typeface="Calibri" panose="020F0502020204030204"/>
+                <a:ea typeface=""/>
+                <a:cs typeface=""/>
+              </a:rPr>
+              <a:t>Rosette</a:t>
+            </a:r>
+            <a:r>
+              <a:rPr kumimoji="0" lang="en-US" sz="1500" b="0" i="0" u="none" strike="noStrike" kern="0" cap="small" spc="0" normalizeH="0" noProof="0" dirty="0" smtClean="0">
+                <a:ln>
+                  <a:noFill/>
+                </a:ln>
+                <a:solidFill>
+                  <a:prstClr val="black"/>
+                </a:solidFill>
+                <a:effectLst/>
+                <a:uLnTx/>
+                <a:uFillTx/>
+                <a:latin typeface="Calibri" panose="020F0502020204030204"/>
+                <a:ea typeface=""/>
+                <a:cs typeface=""/>
+              </a:rPr>
+              <a:t> implementations of built-in functions</a:t>
+            </a:r>
+            <a:endParaRPr kumimoji="0" lang="en-US" sz="1500" b="0" i="0" u="none" strike="noStrike" kern="0" cap="small" spc="0" normalizeH="0" baseline="0" noProof="0" dirty="0" smtClean="0">
+              <a:ln>
+                <a:noFill/>
+              </a:ln>
+              <a:solidFill>
+                <a:prstClr val="black"/>
+              </a:solidFill>
+              <a:effectLst/>
+              <a:uLnTx/>
+              <a:uFillTx/>
+              <a:latin typeface="Calibri" panose="020F0502020204030204"/>
+              <a:ea typeface=""/>
+              <a:cs typeface=""/>
+            </a:endParaRPr>
+          </a:p>
+        </p:txBody>
+      </p:sp>
+      <p:sp>
+        <p:nvSpPr>
+          <p:cNvPr id="12" name="Oval 11"/>
+          <p:cNvSpPr/>
+          <p:nvPr/>
+        </p:nvSpPr>
+        <p:spPr>
+          <a:xfrm>
+            <a:off x="6597482" y="3262073"/>
+            <a:ext cx="2590800" cy="1095718"/>
+          </a:xfrm>
+          <a:prstGeom prst="ellipse">
+            <a:avLst/>
+          </a:prstGeom>
+          <a:solidFill>
+            <a:srgbClr val="EDB4B7">
+              <a:alpha val="50000"/>
+            </a:srgbClr>
+          </a:solidFill>
+          <a:ln w="6350" cap="flat" cmpd="sng" algn="ctr">
+            <a:solidFill>
+              <a:srgbClr val="C00000">
+                <a:alpha val="50000"/>
+              </a:srgbClr>
+            </a:solidFill>
+            <a:prstDash val="solid"/>
+            <a:miter lim="800000"/>
+          </a:ln>
+          <a:effectLst/>
+        </p:spPr>
+        <p:txBody>
+          <a:bodyPr rtlCol="0" anchor="ctr"/>
+          <a:lstStyle/>
+          <a:p>
+            <a:pPr marL="0" marR="0" lvl="0" indent="0" algn="ctr" defTabSz="914400" eaLnBrk="1" fontAlgn="auto" latinLnBrk="0" hangingPunct="1">
+              <a:lnSpc>
+                <a:spcPct val="100000"/>
+              </a:lnSpc>
+              <a:spcBef>
+                <a:spcPts val="0"/>
+              </a:spcBef>
+              <a:spcAft>
+                <a:spcPts val="0"/>
+              </a:spcAft>
+              <a:buClrTx/>
+              <a:buSzTx/>
+              <a:buFontTx/>
+              <a:buNone/>
+              <a:tabLst/>
+              <a:defRPr/>
+            </a:pPr>
+            <a:r>
+              <a:rPr kumimoji="0" lang="en-US" sz="1500" b="0" i="0" u="none" strike="noStrike" kern="0" cap="small" spc="0" normalizeH="0" baseline="0" noProof="0" dirty="0" smtClean="0">
+                <a:ln>
+                  <a:noFill/>
+                </a:ln>
+                <a:solidFill>
+                  <a:prstClr val="black"/>
+                </a:solidFill>
+                <a:effectLst/>
+                <a:uLnTx/>
+                <a:uFillTx/>
+                <a:latin typeface="Calibri" panose="020F0502020204030204"/>
+                <a:ea typeface=""/>
+                <a:cs typeface=""/>
+              </a:rPr>
+              <a:t>Rosette</a:t>
+            </a:r>
+          </a:p>
+          <a:p>
+            <a:pPr marL="0" marR="0" lvl="0" indent="0" algn="ctr" defTabSz="914400" eaLnBrk="1" fontAlgn="auto" latinLnBrk="0" hangingPunct="1">
+              <a:lnSpc>
+                <a:spcPct val="100000"/>
+              </a:lnSpc>
+              <a:spcBef>
+                <a:spcPts val="0"/>
+              </a:spcBef>
+              <a:spcAft>
+                <a:spcPts val="0"/>
+              </a:spcAft>
+              <a:buClrTx/>
+              <a:buSzTx/>
+              <a:buFontTx/>
+              <a:buNone/>
+              <a:tabLst/>
+              <a:defRPr/>
+            </a:pPr>
+            <a:endParaRPr kumimoji="0" lang="en-US" sz="500" b="0" i="0" u="none" strike="noStrike" kern="0" cap="small" spc="0" normalizeH="0" baseline="0" noProof="0" dirty="0" smtClean="0">
+              <a:ln>
+                <a:noFill/>
+              </a:ln>
+              <a:solidFill>
+                <a:prstClr val="black"/>
+              </a:solidFill>
+              <a:effectLst/>
+              <a:uLnTx/>
+              <a:uFillTx/>
+              <a:latin typeface="Calibri" panose="020F0502020204030204"/>
+              <a:ea typeface=""/>
+              <a:cs typeface=""/>
+            </a:endParaRPr>
+          </a:p>
+          <a:p>
+            <a:pPr marL="0" marR="0" lvl="0" indent="0" algn="ctr" defTabSz="914400" eaLnBrk="1" fontAlgn="auto" latinLnBrk="0" hangingPunct="1">
+              <a:lnSpc>
+                <a:spcPct val="100000"/>
+              </a:lnSpc>
+              <a:spcBef>
+                <a:spcPts val="0"/>
+              </a:spcBef>
+              <a:spcAft>
+                <a:spcPts val="0"/>
+              </a:spcAft>
+              <a:buClrTx/>
+              <a:buSzTx/>
+              <a:buFontTx/>
+              <a:buNone/>
+              <a:tabLst/>
+              <a:defRPr/>
+            </a:pPr>
+            <a:endParaRPr lang="en-US" sz="1500" kern="0" cap="small" dirty="0">
+              <a:solidFill>
+                <a:prstClr val="black"/>
+              </a:solidFill>
+              <a:latin typeface="Calibri" panose="020F0502020204030204"/>
+              <a:ea typeface=""/>
+              <a:cs typeface=""/>
+            </a:endParaRPr>
+          </a:p>
+          <a:p>
+            <a:pPr marL="0" marR="0" lvl="0" indent="0" algn="ctr" defTabSz="914400" eaLnBrk="1" fontAlgn="auto" latinLnBrk="0" hangingPunct="1">
+              <a:lnSpc>
+                <a:spcPct val="100000"/>
+              </a:lnSpc>
+              <a:spcBef>
+                <a:spcPts val="0"/>
+              </a:spcBef>
+              <a:spcAft>
+                <a:spcPts val="0"/>
+              </a:spcAft>
+              <a:buClrTx/>
+              <a:buSzTx/>
+              <a:buFontTx/>
+              <a:buNone/>
+              <a:tabLst/>
+              <a:defRPr/>
+            </a:pPr>
+            <a:endParaRPr kumimoji="0" lang="en-US" sz="1500" b="0" i="0" u="none" strike="noStrike" kern="0" cap="small" spc="0" normalizeH="0" baseline="0" noProof="0" dirty="0" smtClean="0">
+              <a:ln>
+                <a:noFill/>
+              </a:ln>
+              <a:solidFill>
+                <a:prstClr val="black"/>
+              </a:solidFill>
+              <a:effectLst/>
+              <a:uLnTx/>
+              <a:uFillTx/>
+              <a:latin typeface="Calibri" panose="020F0502020204030204"/>
+              <a:ea typeface=""/>
+              <a:cs typeface=""/>
+            </a:endParaRPr>
+          </a:p>
+          <a:p>
+            <a:pPr marL="0" marR="0" lvl="0" indent="0" algn="ctr" defTabSz="914400" eaLnBrk="1" fontAlgn="auto" latinLnBrk="0" hangingPunct="1">
+              <a:lnSpc>
+                <a:spcPct val="100000"/>
+              </a:lnSpc>
+              <a:spcBef>
+                <a:spcPts val="0"/>
+              </a:spcBef>
+              <a:spcAft>
+                <a:spcPts val="0"/>
+              </a:spcAft>
+              <a:buClrTx/>
+              <a:buSzTx/>
+              <a:buFontTx/>
+              <a:buNone/>
+              <a:tabLst/>
+              <a:defRPr/>
+            </a:pPr>
+            <a:endParaRPr kumimoji="0" lang="en-US" sz="1500" b="0" i="0" u="none" strike="noStrike" kern="0" cap="small" spc="0" normalizeH="0" baseline="0" noProof="0" dirty="0" smtClean="0">
+              <a:ln>
+                <a:noFill/>
+              </a:ln>
+              <a:solidFill>
+                <a:prstClr val="black"/>
+              </a:solidFill>
+              <a:effectLst/>
+              <a:uLnTx/>
+              <a:uFillTx/>
+              <a:latin typeface="Calibri" panose="020F0502020204030204"/>
+              <a:ea typeface=""/>
+              <a:cs typeface=""/>
+            </a:endParaRPr>
+          </a:p>
+        </p:txBody>
+      </p:sp>
+      <p:sp>
+        <p:nvSpPr>
+          <p:cNvPr id="13" name="Oval 12"/>
+          <p:cNvSpPr/>
+          <p:nvPr/>
+        </p:nvSpPr>
+        <p:spPr>
+          <a:xfrm>
+            <a:off x="6856975" y="3561612"/>
+            <a:ext cx="2071814" cy="796179"/>
+          </a:xfrm>
+          <a:prstGeom prst="ellipse">
+            <a:avLst/>
+          </a:prstGeom>
+          <a:solidFill>
+            <a:srgbClr val="FFC000">
+              <a:lumMod val="20000"/>
+              <a:lumOff val="80000"/>
+            </a:srgbClr>
+          </a:solidFill>
+          <a:ln w="6350" cap="flat" cmpd="sng" algn="ctr">
+            <a:solidFill>
+              <a:srgbClr val="4472C4">
+                <a:shade val="50000"/>
+              </a:srgbClr>
+            </a:solidFill>
+            <a:prstDash val="solid"/>
+            <a:miter lim="800000"/>
+          </a:ln>
+          <a:effectLst>
+            <a:outerShdw blurRad="50800" dist="25400" dir="2700000" algn="tl" rotWithShape="0">
+              <a:prstClr val="black">
+                <a:alpha val="40000"/>
+              </a:prstClr>
+            </a:outerShdw>
+          </a:effectLst>
+        </p:spPr>
+        <p:txBody>
+          <a:bodyPr rtlCol="0" anchor="ctr"/>
+          <a:lstStyle/>
+          <a:p>
+            <a:pPr marL="0" marR="0" lvl="0" indent="0" algn="ctr" defTabSz="914400" eaLnBrk="1" fontAlgn="auto" latinLnBrk="0" hangingPunct="1">
+              <a:lnSpc>
+                <a:spcPct val="100000"/>
+              </a:lnSpc>
+              <a:spcBef>
+                <a:spcPts val="0"/>
+              </a:spcBef>
+              <a:spcAft>
+                <a:spcPts val="0"/>
+              </a:spcAft>
+              <a:buClrTx/>
+              <a:buSzTx/>
+              <a:buFontTx/>
+              <a:buNone/>
+              <a:tabLst/>
+              <a:defRPr/>
+            </a:pPr>
+            <a:r>
+              <a:rPr kumimoji="0" lang="en-US" sz="1500" b="0" i="0" u="none" strike="noStrike" kern="0" cap="small" spc="0" normalizeH="0" baseline="0" noProof="0" dirty="0" smtClean="0">
+                <a:ln>
+                  <a:noFill/>
+                </a:ln>
+                <a:solidFill>
+                  <a:prstClr val="black"/>
+                </a:solidFill>
+                <a:effectLst/>
+                <a:uLnTx/>
+                <a:uFillTx/>
+                <a:latin typeface="Calibri" panose="020F0502020204030204"/>
+                <a:ea typeface=""/>
+                <a:cs typeface=""/>
+              </a:rPr>
+              <a:t>JSIL Symbolic Interpreter</a:t>
+            </a:r>
+          </a:p>
+        </p:txBody>
+      </p:sp>
+      <p:cxnSp>
+        <p:nvCxnSpPr>
+          <p:cNvPr id="14" name="Curved Connector 18"/>
+          <p:cNvCxnSpPr>
+            <a:stCxn id="8" idx="3"/>
+            <a:endCxn id="13" idx="2"/>
+          </p:cNvCxnSpPr>
+          <p:nvPr/>
+        </p:nvCxnSpPr>
+        <p:spPr>
+          <a:xfrm flipV="1">
+            <a:off x="6396982" y="3959702"/>
+            <a:ext cx="459993" cy="207132"/>
+          </a:xfrm>
+          <a:prstGeom prst="bentConnector3">
+            <a:avLst>
+              <a:gd name="adj1" fmla="val 24826"/>
+            </a:avLst>
+          </a:prstGeom>
+          <a:noFill/>
+          <a:ln w="12700" cap="flat" cmpd="sng" algn="ctr">
+            <a:solidFill>
+              <a:srgbClr val="4472C4"/>
+            </a:solidFill>
+            <a:prstDash val="solid"/>
+            <a:miter lim="800000"/>
+            <a:tailEnd type="triangle"/>
+          </a:ln>
+          <a:effectLst/>
+        </p:spPr>
+      </p:cxnSp>
+      <p:sp>
+        <p:nvSpPr>
+          <p:cNvPr id="16" name="TextBox 15"/>
+          <p:cNvSpPr txBox="1"/>
+          <p:nvPr/>
+        </p:nvSpPr>
+        <p:spPr>
+          <a:xfrm>
+            <a:off x="6842001" y="4589777"/>
+            <a:ext cx="2101762" cy="215444"/>
+          </a:xfrm>
+          <a:prstGeom prst="rect">
+            <a:avLst/>
+          </a:prstGeom>
+          <a:noFill/>
+        </p:spPr>
+        <p:txBody>
+          <a:bodyPr wrap="square" tIns="0" bIns="0" rtlCol="0">
+            <a:spAutoFit/>
+          </a:bodyPr>
+          <a:lstStyle/>
+          <a:p>
+            <a:pPr marL="0" marR="0" lvl="0" indent="0" algn="ctr" defTabSz="914400" eaLnBrk="1" fontAlgn="auto" latinLnBrk="0" hangingPunct="1">
+              <a:lnSpc>
+                <a:spcPct val="100000"/>
+              </a:lnSpc>
+              <a:spcBef>
+                <a:spcPts val="0"/>
+              </a:spcBef>
+              <a:spcAft>
+                <a:spcPts val="0"/>
+              </a:spcAft>
+              <a:buClrTx/>
+              <a:buSzTx/>
+              <a:buFontTx/>
+              <a:buNone/>
+              <a:tabLst/>
+              <a:defRPr/>
+            </a:pPr>
+            <a:r>
+              <a:rPr kumimoji="0" lang="en-US" sz="1400" b="1" i="0" u="none" strike="noStrike" kern="0" cap="none" spc="0" normalizeH="0" baseline="0" noProof="0" dirty="0" smtClean="0">
+                <a:ln>
+                  <a:noFill/>
+                </a:ln>
+                <a:effectLst/>
+                <a:uLnTx/>
+                <a:uFillTx/>
+              </a:rPr>
+              <a:t>Counter-model</a:t>
+            </a:r>
+          </a:p>
+        </p:txBody>
+      </p:sp>
+      <p:cxnSp>
+        <p:nvCxnSpPr>
+          <p:cNvPr id="17" name="Curved Connector 46"/>
+          <p:cNvCxnSpPr>
+            <a:stCxn id="10" idx="4"/>
+            <a:endCxn id="13" idx="7"/>
+          </p:cNvCxnSpPr>
+          <p:nvPr/>
+        </p:nvCxnSpPr>
+        <p:spPr>
+          <a:xfrm rot="16200000" flipH="1">
+            <a:off x="7889859" y="2942690"/>
+            <a:ext cx="738542" cy="732497"/>
+          </a:xfrm>
+          <a:prstGeom prst="bentConnector3">
+            <a:avLst>
+              <a:gd name="adj1" fmla="val 24006"/>
+            </a:avLst>
+          </a:prstGeom>
+          <a:noFill/>
+          <a:ln w="12700" cap="flat" cmpd="sng" algn="ctr">
+            <a:solidFill>
+              <a:srgbClr val="4472C4"/>
+            </a:solidFill>
+            <a:prstDash val="solid"/>
+            <a:miter lim="800000"/>
+            <a:tailEnd type="triangle"/>
+          </a:ln>
+          <a:effectLst/>
+        </p:spPr>
+      </p:cxnSp>
+      <p:cxnSp>
+        <p:nvCxnSpPr>
+          <p:cNvPr id="678" name="Curved Connector 18"/>
+          <p:cNvCxnSpPr>
+            <a:stCxn id="13" idx="4"/>
+            <a:endCxn id="16" idx="0"/>
+          </p:cNvCxnSpPr>
+          <p:nvPr/>
+        </p:nvCxnSpPr>
+        <p:spPr>
+          <a:xfrm>
+            <a:off x="7892882" y="4357791"/>
+            <a:ext cx="0" cy="231986"/>
+          </a:xfrm>
+          <a:prstGeom prst="straightConnector1">
+            <a:avLst/>
+          </a:prstGeom>
+          <a:noFill/>
+          <a:ln w="12700" cap="flat" cmpd="sng" algn="ctr">
+            <a:solidFill>
+              <a:srgbClr val="4472C4"/>
+            </a:solidFill>
+            <a:prstDash val="solid"/>
+            <a:miter lim="800000"/>
+            <a:tailEnd type="triangle"/>
+          </a:ln>
+          <a:effectLst/>
+        </p:spPr>
+      </p:cxnSp>
+    </p:spTree>
+    <p:extLst>
+      <p:ext uri="{BB962C8B-B14F-4D97-AF65-F5344CB8AC3E}">
+        <p14:creationId xmlns:p14="http://schemas.microsoft.com/office/powerpoint/2010/main" val="2096966372"/>
       </p:ext>
     </p:extLst>
   </p:cSld>

</xml_diff>